<commit_message>
Start of a presentation for tomorrow
</commit_message>
<xml_diff>
--- a/Project Springwater.pptx
+++ b/Project Springwater.pptx
@@ -15,6 +15,7 @@
     <p:sldId id="262" r:id="rId9"/>
     <p:sldId id="264" r:id="rId10"/>
     <p:sldId id="265" r:id="rId11"/>
+    <p:sldId id="266" r:id="rId12"/>
   </p:sldIdLst>
   <p:sldSz cx="12192000" cy="6858000"/>
   <p:notesSz cx="6858000" cy="9144000"/>
@@ -113,6 +114,11 @@
       </a:defRPr>
     </a:lvl9pPr>
   </p:defaultTextStyle>
+  <p:extLst>
+    <p:ext uri="{EFAFB233-063F-42B5-8137-9DF3F51BA10A}">
+      <p15:sldGuideLst xmlns:p15="http://schemas.microsoft.com/office/powerpoint/2012/main"/>
+    </p:ext>
+  </p:extLst>
 </p:presentation>
 </file>
 
@@ -6135,7 +6141,11 @@
           <a:bodyPr/>
           <a:lstStyle/>
           <a:p>
-            <a:endParaRPr lang="en-GB"/>
+            <a:r>
+              <a:rPr lang="en-GB" dirty="0" smtClean="0"/>
+              <a:t>Class Diagram</a:t>
+            </a:r>
+            <a:endParaRPr lang="en-GB" dirty="0"/>
           </a:p>
         </p:txBody>
       </p:sp>
@@ -6187,6 +6197,89 @@
   <p:clrMapOvr>
     <a:masterClrMapping/>
   </p:clrMapOvr>
+</p:sld>
+</file>
+
+<file path=ppt/slides/slide11.xml><?xml version="1.0" encoding="utf-8"?>
+<p:sld xmlns:a="http://schemas.openxmlformats.org/drawingml/2006/main" xmlns:r="http://schemas.openxmlformats.org/officeDocument/2006/relationships" xmlns:p="http://schemas.openxmlformats.org/presentationml/2006/main">
+  <p:cSld>
+    <p:spTree>
+      <p:nvGrpSpPr>
+        <p:cNvPr id="1" name=""/>
+        <p:cNvGrpSpPr/>
+        <p:nvPr/>
+      </p:nvGrpSpPr>
+      <p:grpSpPr>
+        <a:xfrm>
+          <a:off x="0" y="0"/>
+          <a:ext cx="0" cy="0"/>
+          <a:chOff x="0" y="0"/>
+          <a:chExt cx="0" cy="0"/>
+        </a:xfrm>
+      </p:grpSpPr>
+      <p:sp>
+        <p:nvSpPr>
+          <p:cNvPr id="7" name="Title 6"/>
+          <p:cNvSpPr>
+            <a:spLocks noGrp="1"/>
+          </p:cNvSpPr>
+          <p:nvPr>
+            <p:ph type="title"/>
+          </p:nvPr>
+        </p:nvSpPr>
+        <p:spPr/>
+        <p:txBody>
+          <a:bodyPr/>
+          <a:lstStyle/>
+          <a:p>
+            <a:r>
+              <a:rPr lang="en-GB" dirty="0" smtClean="0"/>
+              <a:t>Live Demo</a:t>
+            </a:r>
+            <a:endParaRPr lang="en-GB" dirty="0"/>
+          </a:p>
+        </p:txBody>
+      </p:sp>
+      <p:sp>
+        <p:nvSpPr>
+          <p:cNvPr id="8" name="Text Placeholder 7"/>
+          <p:cNvSpPr>
+            <a:spLocks noGrp="1"/>
+          </p:cNvSpPr>
+          <p:nvPr>
+            <p:ph type="body" idx="1"/>
+          </p:nvPr>
+        </p:nvSpPr>
+        <p:spPr/>
+        <p:txBody>
+          <a:bodyPr/>
+          <a:lstStyle/>
+          <a:p>
+            <a:r>
+              <a:rPr lang="en-GB" dirty="0" smtClean="0"/>
+              <a:t>Java desktop app &amp; HTML web app</a:t>
+            </a:r>
+            <a:endParaRPr lang="en-GB" dirty="0"/>
+          </a:p>
+        </p:txBody>
+      </p:sp>
+    </p:spTree>
+    <p:extLst>
+      <p:ext uri="{BB962C8B-B14F-4D97-AF65-F5344CB8AC3E}">
+        <p14:creationId xmlns:p14="http://schemas.microsoft.com/office/powerpoint/2010/main" val="1015714020"/>
+      </p:ext>
+    </p:extLst>
+  </p:cSld>
+  <p:clrMapOvr>
+    <a:masterClrMapping/>
+  </p:clrMapOvr>
+  <p:timing>
+    <p:tnLst>
+      <p:par>
+        <p:cTn id="1" dur="indefinite" restart="never" nodeType="tmRoot"/>
+      </p:par>
+    </p:tnLst>
+  </p:timing>
 </p:sld>
 </file>
 

</xml_diff>

<commit_message>
Update Presentation and Horozontal SQL ERD
</commit_message>
<xml_diff>
--- a/Project Springwater.pptx
+++ b/Project Springwater.pptx
@@ -7,16 +7,24 @@
   <p:sldIdLst>
     <p:sldId id="256" r:id="rId2"/>
     <p:sldId id="257" r:id="rId3"/>
-    <p:sldId id="258" r:id="rId4"/>
-    <p:sldId id="263" r:id="rId5"/>
-    <p:sldId id="259" r:id="rId6"/>
-    <p:sldId id="260" r:id="rId7"/>
-    <p:sldId id="262" r:id="rId8"/>
-    <p:sldId id="264" r:id="rId9"/>
-    <p:sldId id="267" r:id="rId10"/>
-    <p:sldId id="265" r:id="rId11"/>
-    <p:sldId id="266" r:id="rId12"/>
-    <p:sldId id="268" r:id="rId13"/>
+    <p:sldId id="273" r:id="rId4"/>
+    <p:sldId id="258" r:id="rId5"/>
+    <p:sldId id="263" r:id="rId6"/>
+    <p:sldId id="259" r:id="rId7"/>
+    <p:sldId id="260" r:id="rId8"/>
+    <p:sldId id="271" r:id="rId9"/>
+    <p:sldId id="274" r:id="rId10"/>
+    <p:sldId id="276" r:id="rId11"/>
+    <p:sldId id="262" r:id="rId12"/>
+    <p:sldId id="264" r:id="rId13"/>
+    <p:sldId id="272" r:id="rId14"/>
+    <p:sldId id="267" r:id="rId15"/>
+    <p:sldId id="275" r:id="rId16"/>
+    <p:sldId id="265" r:id="rId17"/>
+    <p:sldId id="269" r:id="rId18"/>
+    <p:sldId id="270" r:id="rId19"/>
+    <p:sldId id="266" r:id="rId20"/>
+    <p:sldId id="268" r:id="rId21"/>
   </p:sldIdLst>
   <p:sldSz cx="12192000" cy="6858000"/>
   <p:notesSz cx="6858000" cy="9144000"/>
@@ -6107,6 +6115,13 @@
   <p:clrMapOvr>
     <a:masterClrMapping/>
   </p:clrMapOvr>
+  <p:timing>
+    <p:tnLst>
+      <p:par>
+        <p:cTn id="1" dur="indefinite" restart="never" nodeType="tmRoot"/>
+      </p:par>
+    </p:tnLst>
+  </p:timing>
 </p:sld>
 </file>
 
@@ -6144,7 +6159,7 @@
           <a:p>
             <a:r>
               <a:rPr lang="en-GB" dirty="0" smtClean="0"/>
-              <a:t>Class Diagrams</a:t>
+              <a:t>ERD: Entity Relationship Diagrams</a:t>
             </a:r>
             <a:endParaRPr lang="en-GB" dirty="0"/>
           </a:p>
@@ -6152,13 +6167,13 @@
       </p:sp>
       <p:pic>
         <p:nvPicPr>
-          <p:cNvPr id="3" name="Picture 2"/>
+          <p:cNvPr id="4" name="Picture 3"/>
           <p:cNvPicPr>
             <a:picLocks noChangeAspect="1"/>
           </p:cNvPicPr>
           <p:nvPr/>
         </p:nvPicPr>
-        <p:blipFill rotWithShape="1">
+        <p:blipFill>
           <a:blip r:embed="rId2">
             <a:extLst>
               <a:ext uri="{28A0092B-C50C-407E-A947-70E740481C1C}">
@@ -6166,13 +6181,14 @@
               </a:ext>
             </a:extLst>
           </a:blip>
-          <a:srcRect l="5474" r="18038" b="41141"/>
-          <a:stretch/>
+          <a:stretch>
+            <a:fillRect/>
+          </a:stretch>
         </p:blipFill>
         <p:spPr>
           <a:xfrm>
-            <a:off x="757881" y="1317788"/>
-            <a:ext cx="4071904" cy="4819402"/>
+            <a:off x="324817" y="1152983"/>
+            <a:ext cx="5572125" cy="2809875"/>
           </a:xfrm>
           <a:prstGeom prst="rect">
             <a:avLst/>
@@ -6181,103 +6197,51 @@
       </p:pic>
       <p:pic>
         <p:nvPicPr>
-          <p:cNvPr id="7" name="Picture 6"/>
+          <p:cNvPr id="5" name="Picture 4"/>
           <p:cNvPicPr>
             <a:picLocks noChangeAspect="1"/>
           </p:cNvPicPr>
           <p:nvPr/>
         </p:nvPicPr>
-        <p:blipFill rotWithShape="1">
-          <a:blip r:embed="rId2">
+        <p:blipFill>
+          <a:blip r:embed="rId3">
             <a:extLst>
               <a:ext uri="{28A0092B-C50C-407E-A947-70E740481C1C}">
                 <a14:useLocalDpi xmlns:a14="http://schemas.microsoft.com/office/drawing/2010/main" val="0"/>
               </a:ext>
             </a:extLst>
           </a:blip>
-          <a:srcRect t="67988"/>
-          <a:stretch/>
+          <a:stretch>
+            <a:fillRect/>
+          </a:stretch>
         </p:blipFill>
         <p:spPr>
           <a:xfrm>
-            <a:off x="4941555" y="1317788"/>
-            <a:ext cx="6308159" cy="3105931"/>
+            <a:off x="6011506" y="1152983"/>
+            <a:ext cx="4265007" cy="5623457"/>
           </a:xfrm>
           <a:prstGeom prst="rect">
             <a:avLst/>
           </a:prstGeom>
         </p:spPr>
       </p:pic>
-      <p:sp>
-        <p:nvSpPr>
-          <p:cNvPr id="4" name="TextBox 3"/>
-          <p:cNvSpPr txBox="1"/>
-          <p:nvPr/>
-        </p:nvSpPr>
-        <p:spPr>
-          <a:xfrm>
-            <a:off x="4829785" y="5767858"/>
-            <a:ext cx="3146854" cy="369332"/>
-          </a:xfrm>
-          <a:prstGeom prst="rect">
-            <a:avLst/>
-          </a:prstGeom>
-          <a:noFill/>
-        </p:spPr>
-        <p:txBody>
-          <a:bodyPr wrap="square" rtlCol="0">
-            <a:spAutoFit/>
-          </a:bodyPr>
-          <a:lstStyle/>
-          <a:p>
-            <a:r>
-              <a:rPr lang="en-GB" dirty="0" smtClean="0"/>
-              <a:t>Java Desktop App</a:t>
-            </a:r>
-            <a:endParaRPr lang="en-GB" dirty="0"/>
-          </a:p>
-        </p:txBody>
-      </p:sp>
-      <p:sp>
-        <p:nvSpPr>
-          <p:cNvPr id="8" name="TextBox 7"/>
-          <p:cNvSpPr txBox="1"/>
-          <p:nvPr/>
-        </p:nvSpPr>
-        <p:spPr>
-          <a:xfrm>
-            <a:off x="9248591" y="4423719"/>
-            <a:ext cx="2001123" cy="369332"/>
-          </a:xfrm>
-          <a:prstGeom prst="rect">
-            <a:avLst/>
-          </a:prstGeom>
-          <a:noFill/>
-        </p:spPr>
-        <p:txBody>
-          <a:bodyPr wrap="square" rtlCol="0">
-            <a:spAutoFit/>
-          </a:bodyPr>
-          <a:lstStyle/>
-          <a:p>
-            <a:r>
-              <a:rPr lang="en-GB" dirty="0" smtClean="0"/>
-              <a:t>HTML Web App</a:t>
-            </a:r>
-            <a:endParaRPr lang="en-GB" dirty="0"/>
-          </a:p>
-        </p:txBody>
-      </p:sp>
     </p:spTree>
     <p:extLst>
       <p:ext uri="{BB962C8B-B14F-4D97-AF65-F5344CB8AC3E}">
-        <p14:creationId xmlns:p14="http://schemas.microsoft.com/office/powerpoint/2010/main" val="792256795"/>
+        <p14:creationId xmlns:p14="http://schemas.microsoft.com/office/powerpoint/2010/main" val="1154762100"/>
       </p:ext>
     </p:extLst>
   </p:cSld>
   <p:clrMapOvr>
     <a:masterClrMapping/>
   </p:clrMapOvr>
+  <p:timing>
+    <p:tnLst>
+      <p:par>
+        <p:cTn id="1" dur="indefinite" restart="never" nodeType="tmRoot"/>
+      </p:par>
+    </p:tnLst>
+  </p:timing>
 </p:sld>
 </file>
 
@@ -6300,7 +6264,7 @@
       </p:grpSpPr>
       <p:sp>
         <p:nvSpPr>
-          <p:cNvPr id="7" name="Title 6"/>
+          <p:cNvPr id="3" name="Title 2"/>
           <p:cNvSpPr>
             <a:spLocks noGrp="1"/>
           </p:cNvSpPr>
@@ -6315,35 +6279,7 @@
           <a:p>
             <a:r>
               <a:rPr lang="en-GB" dirty="0" smtClean="0"/>
-              <a:t>Live Demo</a:t>
-            </a:r>
-            <a:endParaRPr lang="en-GB" dirty="0"/>
-          </a:p>
-        </p:txBody>
-      </p:sp>
-      <p:sp>
-        <p:nvSpPr>
-          <p:cNvPr id="8" name="Text Placeholder 7"/>
-          <p:cNvSpPr>
-            <a:spLocks noGrp="1"/>
-          </p:cNvSpPr>
-          <p:nvPr>
-            <p:ph type="body" idx="1"/>
-          </p:nvPr>
-        </p:nvSpPr>
-        <p:spPr>
-          <a:xfrm>
-            <a:off x="1154955" y="4777380"/>
-            <a:ext cx="8825658" cy="860400"/>
-          </a:xfrm>
-        </p:spPr>
-        <p:txBody>
-          <a:bodyPr/>
-          <a:lstStyle/>
-          <a:p>
-            <a:r>
-              <a:rPr lang="en-GB" dirty="0" smtClean="0"/>
-              <a:t>Java desktop app &amp; HTML web app</a:t>
+              <a:t>System Design</a:t>
             </a:r>
             <a:endParaRPr lang="en-GB" dirty="0"/>
           </a:p>
@@ -6352,7 +6288,7 @@
     </p:spTree>
     <p:extLst>
       <p:ext uri="{BB962C8B-B14F-4D97-AF65-F5344CB8AC3E}">
-        <p14:creationId xmlns:p14="http://schemas.microsoft.com/office/powerpoint/2010/main" val="1015714020"/>
+        <p14:creationId xmlns:p14="http://schemas.microsoft.com/office/powerpoint/2010/main" val="4057533121"/>
       </p:ext>
     </p:extLst>
   </p:cSld>
@@ -6388,7 +6324,7 @@
       </p:grpSpPr>
       <p:sp>
         <p:nvSpPr>
-          <p:cNvPr id="7" name="Title 6"/>
+          <p:cNvPr id="4" name="Title 3"/>
           <p:cNvSpPr>
             <a:spLocks noGrp="1"/>
           </p:cNvSpPr>
@@ -6403,16 +6339,974 @@
           <a:p>
             <a:r>
               <a:rPr lang="en-GB" dirty="0" smtClean="0"/>
-              <a:t>Questions?</a:t>
+              <a:t>Development Practices</a:t>
             </a:r>
             <a:endParaRPr lang="en-GB" dirty="0"/>
+          </a:p>
+        </p:txBody>
+      </p:sp>
+      <p:sp>
+        <p:nvSpPr>
+          <p:cNvPr id="7" name="Content Placeholder 6"/>
+          <p:cNvSpPr>
+            <a:spLocks noGrp="1"/>
+          </p:cNvSpPr>
+          <p:nvPr>
+            <p:ph sz="half" idx="1"/>
+          </p:nvPr>
+        </p:nvSpPr>
+        <p:spPr/>
+        <p:txBody>
+          <a:bodyPr/>
+          <a:lstStyle/>
+          <a:p>
+            <a:r>
+              <a:rPr lang="en-GB" dirty="0" smtClean="0"/>
+              <a:t>Agile Development</a:t>
+            </a:r>
+          </a:p>
+          <a:p>
+            <a:pPr lvl="1"/>
+            <a:r>
+              <a:rPr lang="en-GB" dirty="0" smtClean="0"/>
+              <a:t>Scrum Meetings</a:t>
+            </a:r>
+          </a:p>
+          <a:p>
+            <a:pPr lvl="1"/>
+            <a:r>
+              <a:rPr lang="en-GB" dirty="0" smtClean="0"/>
+              <a:t>Sprints</a:t>
+            </a:r>
+          </a:p>
+          <a:p>
+            <a:pPr lvl="1"/>
+            <a:r>
+              <a:rPr lang="en-GB" dirty="0" smtClean="0"/>
+              <a:t>Multiple Projects</a:t>
+            </a:r>
+          </a:p>
+          <a:p>
+            <a:pPr lvl="1"/>
+            <a:r>
+              <a:rPr lang="en-GB" dirty="0" smtClean="0"/>
+              <a:t>Sprint Retrospectives</a:t>
+            </a:r>
+          </a:p>
+          <a:p>
+            <a:pPr lvl="2"/>
+            <a:r>
+              <a:rPr lang="en-GB" dirty="0" smtClean="0"/>
+              <a:t>Demo Soon!</a:t>
+            </a:r>
+          </a:p>
+          <a:p>
+            <a:pPr lvl="1"/>
+            <a:endParaRPr lang="en-GB" dirty="0" smtClean="0"/>
           </a:p>
         </p:txBody>
       </p:sp>
     </p:spTree>
     <p:extLst>
       <p:ext uri="{BB962C8B-B14F-4D97-AF65-F5344CB8AC3E}">
-        <p14:creationId xmlns:p14="http://schemas.microsoft.com/office/powerpoint/2010/main" val="1417643140"/>
+        <p14:creationId xmlns:p14="http://schemas.microsoft.com/office/powerpoint/2010/main" val="1493559869"/>
+      </p:ext>
+    </p:extLst>
+  </p:cSld>
+  <p:clrMapOvr>
+    <a:masterClrMapping/>
+  </p:clrMapOvr>
+  <p:timing>
+    <p:tnLst>
+      <p:par>
+        <p:cTn id="1" dur="indefinite" restart="never" nodeType="tmRoot"/>
+      </p:par>
+    </p:tnLst>
+  </p:timing>
+</p:sld>
+</file>
+
+<file path=ppt/slides/slide13.xml><?xml version="1.0" encoding="utf-8"?>
+<p:sld xmlns:a="http://schemas.openxmlformats.org/drawingml/2006/main" xmlns:r="http://schemas.openxmlformats.org/officeDocument/2006/relationships" xmlns:p="http://schemas.openxmlformats.org/presentationml/2006/main">
+  <p:cSld>
+    <p:spTree>
+      <p:nvGrpSpPr>
+        <p:cNvPr id="1" name=""/>
+        <p:cNvGrpSpPr/>
+        <p:nvPr/>
+      </p:nvGrpSpPr>
+      <p:grpSpPr>
+        <a:xfrm>
+          <a:off x="0" y="0"/>
+          <a:ext cx="0" cy="0"/>
+          <a:chOff x="0" y="0"/>
+          <a:chExt cx="0" cy="0"/>
+        </a:xfrm>
+      </p:grpSpPr>
+      <p:sp>
+        <p:nvSpPr>
+          <p:cNvPr id="4" name="Title 3"/>
+          <p:cNvSpPr>
+            <a:spLocks noGrp="1"/>
+          </p:cNvSpPr>
+          <p:nvPr>
+            <p:ph type="title"/>
+          </p:nvPr>
+        </p:nvSpPr>
+        <p:spPr/>
+        <p:txBody>
+          <a:bodyPr/>
+          <a:lstStyle/>
+          <a:p>
+            <a:r>
+              <a:rPr lang="en-GB" dirty="0" smtClean="0"/>
+              <a:t>Design Patterns</a:t>
+            </a:r>
+            <a:endParaRPr lang="en-GB" dirty="0"/>
+          </a:p>
+        </p:txBody>
+      </p:sp>
+      <p:sp>
+        <p:nvSpPr>
+          <p:cNvPr id="7" name="Content Placeholder 6"/>
+          <p:cNvSpPr>
+            <a:spLocks noGrp="1"/>
+          </p:cNvSpPr>
+          <p:nvPr>
+            <p:ph sz="half" idx="1"/>
+          </p:nvPr>
+        </p:nvSpPr>
+        <p:spPr/>
+        <p:txBody>
+          <a:bodyPr/>
+          <a:lstStyle/>
+          <a:p>
+            <a:r>
+              <a:rPr lang="en-GB" dirty="0" smtClean="0"/>
+              <a:t>MVC</a:t>
+            </a:r>
+          </a:p>
+          <a:p>
+            <a:pPr lvl="1"/>
+            <a:r>
+              <a:rPr lang="en-GB" dirty="0" smtClean="0"/>
+              <a:t>Model</a:t>
+            </a:r>
+          </a:p>
+          <a:p>
+            <a:pPr lvl="1"/>
+            <a:r>
+              <a:rPr lang="en-GB" dirty="0" smtClean="0"/>
+              <a:t>View</a:t>
+            </a:r>
+          </a:p>
+          <a:p>
+            <a:pPr lvl="1"/>
+            <a:r>
+              <a:rPr lang="en-GB" dirty="0" smtClean="0"/>
+              <a:t>Controller</a:t>
+            </a:r>
+          </a:p>
+          <a:p>
+            <a:pPr lvl="1"/>
+            <a:endParaRPr lang="en-GB" dirty="0"/>
+          </a:p>
+          <a:p>
+            <a:r>
+              <a:rPr lang="en-GB" dirty="0" smtClean="0"/>
+              <a:t>Objects First</a:t>
+            </a:r>
+            <a:endParaRPr lang="en-GB" dirty="0"/>
+          </a:p>
+        </p:txBody>
+      </p:sp>
+      <p:pic>
+        <p:nvPicPr>
+          <p:cNvPr id="1026" name="Picture 2" descr="http://www.doolwind.com/images/blog/MVC.png"/>
+          <p:cNvPicPr>
+            <a:picLocks noChangeAspect="1" noChangeArrowheads="1"/>
+          </p:cNvPicPr>
+          <p:nvPr/>
+        </p:nvPicPr>
+        <p:blipFill>
+          <a:blip r:embed="rId2">
+            <a:extLst>
+              <a:ext uri="{28A0092B-C50C-407E-A947-70E740481C1C}">
+                <a14:useLocalDpi xmlns:a14="http://schemas.microsoft.com/office/drawing/2010/main" val="0"/>
+              </a:ext>
+            </a:extLst>
+          </a:blip>
+          <a:srcRect/>
+          <a:stretch>
+            <a:fillRect/>
+          </a:stretch>
+        </p:blipFill>
+        <p:spPr bwMode="auto">
+          <a:xfrm>
+            <a:off x="6277096" y="1390478"/>
+            <a:ext cx="4357953" cy="4499183"/>
+          </a:xfrm>
+          <a:prstGeom prst="rect">
+            <a:avLst/>
+          </a:prstGeom>
+          <a:noFill/>
+          <a:extLst>
+            <a:ext uri="{909E8E84-426E-40DD-AFC4-6F175D3DCCD1}">
+              <a14:hiddenFill xmlns:a14="http://schemas.microsoft.com/office/drawing/2010/main">
+                <a:solidFill>
+                  <a:srgbClr val="FFFFFF"/>
+                </a:solidFill>
+              </a14:hiddenFill>
+            </a:ext>
+          </a:extLst>
+        </p:spPr>
+      </p:pic>
+    </p:spTree>
+    <p:extLst>
+      <p:ext uri="{BB962C8B-B14F-4D97-AF65-F5344CB8AC3E}">
+        <p14:creationId xmlns:p14="http://schemas.microsoft.com/office/powerpoint/2010/main" val="579424086"/>
+      </p:ext>
+    </p:extLst>
+  </p:cSld>
+  <p:clrMapOvr>
+    <a:masterClrMapping/>
+  </p:clrMapOvr>
+  <p:timing>
+    <p:tnLst>
+      <p:par>
+        <p:cTn id="1" dur="indefinite" restart="never" nodeType="tmRoot"/>
+      </p:par>
+    </p:tnLst>
+  </p:timing>
+</p:sld>
+</file>
+
+<file path=ppt/slides/slide14.xml><?xml version="1.0" encoding="utf-8"?>
+<p:sld xmlns:a="http://schemas.openxmlformats.org/drawingml/2006/main" xmlns:r="http://schemas.openxmlformats.org/officeDocument/2006/relationships" xmlns:p="http://schemas.openxmlformats.org/presentationml/2006/main">
+  <p:cSld>
+    <p:spTree>
+      <p:nvGrpSpPr>
+        <p:cNvPr id="1" name=""/>
+        <p:cNvGrpSpPr/>
+        <p:nvPr/>
+      </p:nvGrpSpPr>
+      <p:grpSpPr>
+        <a:xfrm>
+          <a:off x="0" y="0"/>
+          <a:ext cx="0" cy="0"/>
+          <a:chOff x="0" y="0"/>
+          <a:chExt cx="0" cy="0"/>
+        </a:xfrm>
+      </p:grpSpPr>
+      <p:sp>
+        <p:nvSpPr>
+          <p:cNvPr id="2" name="Title 1"/>
+          <p:cNvSpPr>
+            <a:spLocks noGrp="1"/>
+          </p:cNvSpPr>
+          <p:nvPr>
+            <p:ph type="title"/>
+          </p:nvPr>
+        </p:nvSpPr>
+        <p:spPr/>
+        <p:txBody>
+          <a:bodyPr/>
+          <a:lstStyle/>
+          <a:p>
+            <a:r>
+              <a:rPr lang="en-GB" dirty="0" smtClean="0"/>
+              <a:t>Utilised Tools</a:t>
+            </a:r>
+            <a:endParaRPr lang="en-GB" dirty="0"/>
+          </a:p>
+        </p:txBody>
+      </p:sp>
+      <p:sp>
+        <p:nvSpPr>
+          <p:cNvPr id="3" name="Content Placeholder 2"/>
+          <p:cNvSpPr>
+            <a:spLocks noGrp="1"/>
+          </p:cNvSpPr>
+          <p:nvPr>
+            <p:ph sz="half" idx="1"/>
+          </p:nvPr>
+        </p:nvSpPr>
+        <p:spPr/>
+        <p:txBody>
+          <a:bodyPr anchor="ctr"/>
+          <a:lstStyle/>
+          <a:p>
+            <a:r>
+              <a:rPr lang="en-GB" dirty="0" smtClean="0"/>
+              <a:t>Development Environment</a:t>
+            </a:r>
+          </a:p>
+          <a:p>
+            <a:pPr lvl="1"/>
+            <a:r>
+              <a:rPr lang="en-GB" dirty="0" smtClean="0"/>
+              <a:t>Maven</a:t>
+            </a:r>
+            <a:endParaRPr lang="en-GB" dirty="0" smtClean="0"/>
+          </a:p>
+          <a:p>
+            <a:pPr lvl="1"/>
+            <a:r>
+              <a:rPr lang="en-GB" dirty="0" smtClean="0"/>
+              <a:t>Git</a:t>
+            </a:r>
+          </a:p>
+          <a:p>
+            <a:pPr lvl="1"/>
+            <a:r>
+              <a:rPr lang="en-GB" dirty="0" err="1" smtClean="0"/>
+              <a:t>Jira</a:t>
+            </a:r>
+            <a:endParaRPr lang="en-GB" dirty="0" smtClean="0"/>
+          </a:p>
+          <a:p>
+            <a:pPr lvl="1"/>
+            <a:r>
+              <a:rPr lang="en-GB" dirty="0" err="1" smtClean="0"/>
+              <a:t>Docker</a:t>
+            </a:r>
+            <a:endParaRPr lang="en-GB" dirty="0" smtClean="0"/>
+          </a:p>
+          <a:p>
+            <a:r>
+              <a:rPr lang="en-GB" dirty="0" smtClean="0"/>
+              <a:t>Libraries and Frameworks</a:t>
+            </a:r>
+            <a:endParaRPr lang="en-GB" dirty="0" smtClean="0"/>
+          </a:p>
+          <a:p>
+            <a:pPr lvl="1"/>
+            <a:r>
+              <a:rPr lang="en-GB" dirty="0" smtClean="0"/>
+              <a:t>Spring</a:t>
+            </a:r>
+          </a:p>
+          <a:p>
+            <a:pPr lvl="1"/>
+            <a:r>
+              <a:rPr lang="en-GB" dirty="0" smtClean="0"/>
+              <a:t>Bootstrap</a:t>
+            </a:r>
+          </a:p>
+          <a:p>
+            <a:pPr lvl="1"/>
+            <a:r>
+              <a:rPr lang="en-GB" dirty="0" smtClean="0"/>
+              <a:t>Swing</a:t>
+            </a:r>
+            <a:endParaRPr lang="en-GB" dirty="0" smtClean="0"/>
+          </a:p>
+        </p:txBody>
+      </p:sp>
+      <p:pic>
+        <p:nvPicPr>
+          <p:cNvPr id="1026" name="Picture 2" descr="http://pngimg.com/upload/wrench_PNG1116.png"/>
+          <p:cNvPicPr>
+            <a:picLocks noChangeAspect="1" noChangeArrowheads="1"/>
+          </p:cNvPicPr>
+          <p:nvPr/>
+        </p:nvPicPr>
+        <p:blipFill>
+          <a:blip r:embed="rId2">
+            <a:extLst>
+              <a:ext uri="{28A0092B-C50C-407E-A947-70E740481C1C}">
+                <a14:useLocalDpi xmlns:a14="http://schemas.microsoft.com/office/drawing/2010/main" val="0"/>
+              </a:ext>
+            </a:extLst>
+          </a:blip>
+          <a:srcRect/>
+          <a:stretch>
+            <a:fillRect/>
+          </a:stretch>
+        </p:blipFill>
+        <p:spPr bwMode="auto">
+          <a:xfrm>
+            <a:off x="5569450" y="2060575"/>
+            <a:ext cx="4481384" cy="3361038"/>
+          </a:xfrm>
+          <a:prstGeom prst="rect">
+            <a:avLst/>
+          </a:prstGeom>
+          <a:noFill/>
+          <a:extLst>
+            <a:ext uri="{909E8E84-426E-40DD-AFC4-6F175D3DCCD1}">
+              <a14:hiddenFill xmlns:a14="http://schemas.microsoft.com/office/drawing/2010/main">
+                <a:solidFill>
+                  <a:srgbClr val="FFFFFF"/>
+                </a:solidFill>
+              </a14:hiddenFill>
+            </a:ext>
+          </a:extLst>
+        </p:spPr>
+      </p:pic>
+    </p:spTree>
+    <p:extLst>
+      <p:ext uri="{BB962C8B-B14F-4D97-AF65-F5344CB8AC3E}">
+        <p14:creationId xmlns:p14="http://schemas.microsoft.com/office/powerpoint/2010/main" val="2164039892"/>
+      </p:ext>
+    </p:extLst>
+  </p:cSld>
+  <p:clrMapOvr>
+    <a:masterClrMapping/>
+  </p:clrMapOvr>
+  <p:timing>
+    <p:tnLst>
+      <p:par>
+        <p:cTn id="1" dur="indefinite" restart="never" nodeType="tmRoot"/>
+      </p:par>
+    </p:tnLst>
+  </p:timing>
+</p:sld>
+</file>
+
+<file path=ppt/slides/slide15.xml><?xml version="1.0" encoding="utf-8"?>
+<p:sld xmlns:a="http://schemas.openxmlformats.org/drawingml/2006/main" xmlns:r="http://schemas.openxmlformats.org/officeDocument/2006/relationships" xmlns:p="http://schemas.openxmlformats.org/presentationml/2006/main">
+  <p:cSld>
+    <p:spTree>
+      <p:nvGrpSpPr>
+        <p:cNvPr id="1" name=""/>
+        <p:cNvGrpSpPr/>
+        <p:nvPr/>
+      </p:nvGrpSpPr>
+      <p:grpSpPr>
+        <a:xfrm>
+          <a:off x="0" y="0"/>
+          <a:ext cx="0" cy="0"/>
+          <a:chOff x="0" y="0"/>
+          <a:chExt cx="0" cy="0"/>
+        </a:xfrm>
+      </p:grpSpPr>
+      <p:sp>
+        <p:nvSpPr>
+          <p:cNvPr id="2" name="Title 1"/>
+          <p:cNvSpPr>
+            <a:spLocks noGrp="1"/>
+          </p:cNvSpPr>
+          <p:nvPr>
+            <p:ph type="title"/>
+          </p:nvPr>
+        </p:nvSpPr>
+        <p:spPr/>
+        <p:txBody>
+          <a:bodyPr/>
+          <a:lstStyle/>
+          <a:p>
+            <a:r>
+              <a:rPr lang="en-GB" dirty="0" smtClean="0"/>
+              <a:t>Issue Count</a:t>
+            </a:r>
+            <a:endParaRPr lang="en-GB" dirty="0"/>
+          </a:p>
+        </p:txBody>
+      </p:sp>
+      <p:pic>
+        <p:nvPicPr>
+          <p:cNvPr id="5" name="Picture 4"/>
+          <p:cNvPicPr>
+            <a:picLocks noChangeAspect="1"/>
+          </p:cNvPicPr>
+          <p:nvPr/>
+        </p:nvPicPr>
+        <p:blipFill rotWithShape="1">
+          <a:blip r:embed="rId2"/>
+          <a:srcRect l="2916" t="37778" b="9723"/>
+          <a:stretch/>
+        </p:blipFill>
+        <p:spPr>
+          <a:xfrm>
+            <a:off x="396995" y="2057913"/>
+            <a:ext cx="11398009" cy="3467099"/>
+          </a:xfrm>
+          <a:prstGeom prst="rect">
+            <a:avLst/>
+          </a:prstGeom>
+        </p:spPr>
+      </p:pic>
+    </p:spTree>
+    <p:extLst>
+      <p:ext uri="{BB962C8B-B14F-4D97-AF65-F5344CB8AC3E}">
+        <p14:creationId xmlns:p14="http://schemas.microsoft.com/office/powerpoint/2010/main" val="624692081"/>
+      </p:ext>
+    </p:extLst>
+  </p:cSld>
+  <p:clrMapOvr>
+    <a:masterClrMapping/>
+  </p:clrMapOvr>
+  <p:timing>
+    <p:tnLst>
+      <p:par>
+        <p:cTn id="1" dur="indefinite" restart="never" nodeType="tmRoot"/>
+      </p:par>
+    </p:tnLst>
+  </p:timing>
+</p:sld>
+</file>
+
+<file path=ppt/slides/slide16.xml><?xml version="1.0" encoding="utf-8"?>
+<p:sld xmlns:a="http://schemas.openxmlformats.org/drawingml/2006/main" xmlns:r="http://schemas.openxmlformats.org/officeDocument/2006/relationships" xmlns:p="http://schemas.openxmlformats.org/presentationml/2006/main">
+  <p:cSld>
+    <p:spTree>
+      <p:nvGrpSpPr>
+        <p:cNvPr id="1" name=""/>
+        <p:cNvGrpSpPr/>
+        <p:nvPr/>
+      </p:nvGrpSpPr>
+      <p:grpSpPr>
+        <a:xfrm>
+          <a:off x="0" y="0"/>
+          <a:ext cx="0" cy="0"/>
+          <a:chOff x="0" y="0"/>
+          <a:chExt cx="0" cy="0"/>
+        </a:xfrm>
+      </p:grpSpPr>
+      <p:sp>
+        <p:nvSpPr>
+          <p:cNvPr id="2" name="Title 1"/>
+          <p:cNvSpPr>
+            <a:spLocks noGrp="1"/>
+          </p:cNvSpPr>
+          <p:nvPr>
+            <p:ph type="title"/>
+          </p:nvPr>
+        </p:nvSpPr>
+        <p:spPr/>
+        <p:txBody>
+          <a:bodyPr/>
+          <a:lstStyle/>
+          <a:p>
+            <a:r>
+              <a:rPr lang="en-GB" dirty="0" smtClean="0"/>
+              <a:t>Class Diagrams</a:t>
+            </a:r>
+            <a:endParaRPr lang="en-GB" dirty="0"/>
+          </a:p>
+        </p:txBody>
+      </p:sp>
+      <p:pic>
+        <p:nvPicPr>
+          <p:cNvPr id="7" name="Picture 6"/>
+          <p:cNvPicPr>
+            <a:picLocks noChangeAspect="1"/>
+          </p:cNvPicPr>
+          <p:nvPr/>
+        </p:nvPicPr>
+        <p:blipFill rotWithShape="1">
+          <a:blip r:embed="rId2">
+            <a:extLst>
+              <a:ext uri="{28A0092B-C50C-407E-A947-70E740481C1C}">
+                <a14:useLocalDpi xmlns:a14="http://schemas.microsoft.com/office/drawing/2010/main" val="0"/>
+              </a:ext>
+            </a:extLst>
+          </a:blip>
+          <a:srcRect t="67988"/>
+          <a:stretch/>
+        </p:blipFill>
+        <p:spPr>
+          <a:xfrm>
+            <a:off x="1223618" y="1340216"/>
+            <a:ext cx="9744764" cy="4798003"/>
+          </a:xfrm>
+          <a:prstGeom prst="rect">
+            <a:avLst/>
+          </a:prstGeom>
+        </p:spPr>
+      </p:pic>
+      <p:sp>
+        <p:nvSpPr>
+          <p:cNvPr id="8" name="TextBox 7"/>
+          <p:cNvSpPr txBox="1"/>
+          <p:nvPr/>
+        </p:nvSpPr>
+        <p:spPr>
+          <a:xfrm>
+            <a:off x="8957316" y="6138219"/>
+            <a:ext cx="1955875" cy="369332"/>
+          </a:xfrm>
+          <a:prstGeom prst="rect">
+            <a:avLst/>
+          </a:prstGeom>
+          <a:noFill/>
+        </p:spPr>
+        <p:txBody>
+          <a:bodyPr wrap="square" rtlCol="0">
+            <a:spAutoFit/>
+          </a:bodyPr>
+          <a:lstStyle/>
+          <a:p>
+            <a:r>
+              <a:rPr lang="en-GB" dirty="0" smtClean="0"/>
+              <a:t>HTML Web App</a:t>
+            </a:r>
+            <a:endParaRPr lang="en-GB" dirty="0"/>
+          </a:p>
+        </p:txBody>
+      </p:sp>
+    </p:spTree>
+    <p:extLst>
+      <p:ext uri="{BB962C8B-B14F-4D97-AF65-F5344CB8AC3E}">
+        <p14:creationId xmlns:p14="http://schemas.microsoft.com/office/powerpoint/2010/main" val="792256795"/>
+      </p:ext>
+    </p:extLst>
+  </p:cSld>
+  <p:clrMapOvr>
+    <a:masterClrMapping/>
+  </p:clrMapOvr>
+  <p:timing>
+    <p:tnLst>
+      <p:par>
+        <p:cTn id="1" dur="indefinite" restart="never" nodeType="tmRoot"/>
+      </p:par>
+    </p:tnLst>
+  </p:timing>
+</p:sld>
+</file>
+
+<file path=ppt/slides/slide17.xml><?xml version="1.0" encoding="utf-8"?>
+<p:sld xmlns:a="http://schemas.openxmlformats.org/drawingml/2006/main" xmlns:r="http://schemas.openxmlformats.org/officeDocument/2006/relationships" xmlns:p="http://schemas.openxmlformats.org/presentationml/2006/main">
+  <p:cSld>
+    <p:spTree>
+      <p:nvGrpSpPr>
+        <p:cNvPr id="1" name=""/>
+        <p:cNvGrpSpPr/>
+        <p:nvPr/>
+      </p:nvGrpSpPr>
+      <p:grpSpPr>
+        <a:xfrm>
+          <a:off x="0" y="0"/>
+          <a:ext cx="0" cy="0"/>
+          <a:chOff x="0" y="0"/>
+          <a:chExt cx="0" cy="0"/>
+        </a:xfrm>
+      </p:grpSpPr>
+      <p:sp>
+        <p:nvSpPr>
+          <p:cNvPr id="2" name="Title 1"/>
+          <p:cNvSpPr>
+            <a:spLocks noGrp="1"/>
+          </p:cNvSpPr>
+          <p:nvPr>
+            <p:ph type="title"/>
+          </p:nvPr>
+        </p:nvSpPr>
+        <p:spPr/>
+        <p:txBody>
+          <a:bodyPr/>
+          <a:lstStyle/>
+          <a:p>
+            <a:r>
+              <a:rPr lang="en-GB" dirty="0" smtClean="0"/>
+              <a:t>Class Diagrams</a:t>
+            </a:r>
+            <a:endParaRPr lang="en-GB" dirty="0"/>
+          </a:p>
+        </p:txBody>
+      </p:sp>
+      <p:pic>
+        <p:nvPicPr>
+          <p:cNvPr id="5" name="Picture 4"/>
+          <p:cNvPicPr>
+            <a:picLocks noChangeAspect="1"/>
+          </p:cNvPicPr>
+          <p:nvPr/>
+        </p:nvPicPr>
+        <p:blipFill rotWithShape="1">
+          <a:blip r:embed="rId2">
+            <a:extLst>
+              <a:ext uri="{28A0092B-C50C-407E-A947-70E740481C1C}">
+                <a14:useLocalDpi xmlns:a14="http://schemas.microsoft.com/office/drawing/2010/main" val="0"/>
+              </a:ext>
+            </a:extLst>
+          </a:blip>
+          <a:srcRect l="5474" r="18038" b="41141"/>
+          <a:stretch/>
+        </p:blipFill>
+        <p:spPr>
+          <a:xfrm>
+            <a:off x="3646486" y="1305814"/>
+            <a:ext cx="4393269" cy="5199761"/>
+          </a:xfrm>
+          <a:prstGeom prst="rect">
+            <a:avLst/>
+          </a:prstGeom>
+        </p:spPr>
+      </p:pic>
+      <p:sp>
+        <p:nvSpPr>
+          <p:cNvPr id="6" name="TextBox 5"/>
+          <p:cNvSpPr txBox="1"/>
+          <p:nvPr/>
+        </p:nvSpPr>
+        <p:spPr>
+          <a:xfrm>
+            <a:off x="8039755" y="6136243"/>
+            <a:ext cx="3146854" cy="369332"/>
+          </a:xfrm>
+          <a:prstGeom prst="rect">
+            <a:avLst/>
+          </a:prstGeom>
+          <a:noFill/>
+        </p:spPr>
+        <p:txBody>
+          <a:bodyPr wrap="square" rtlCol="0">
+            <a:spAutoFit/>
+          </a:bodyPr>
+          <a:lstStyle/>
+          <a:p>
+            <a:r>
+              <a:rPr lang="en-GB" dirty="0" smtClean="0"/>
+              <a:t>Java Desktop App</a:t>
+            </a:r>
+            <a:endParaRPr lang="en-GB" dirty="0"/>
+          </a:p>
+        </p:txBody>
+      </p:sp>
+    </p:spTree>
+    <p:extLst>
+      <p:ext uri="{BB962C8B-B14F-4D97-AF65-F5344CB8AC3E}">
+        <p14:creationId xmlns:p14="http://schemas.microsoft.com/office/powerpoint/2010/main" val="4170073327"/>
+      </p:ext>
+    </p:extLst>
+  </p:cSld>
+  <p:clrMapOvr>
+    <a:masterClrMapping/>
+  </p:clrMapOvr>
+  <p:timing>
+    <p:tnLst>
+      <p:par>
+        <p:cTn id="1" dur="indefinite" restart="never" nodeType="tmRoot"/>
+      </p:par>
+    </p:tnLst>
+  </p:timing>
+</p:sld>
+</file>
+
+<file path=ppt/slides/slide18.xml><?xml version="1.0" encoding="utf-8"?>
+<p:sld xmlns:a="http://schemas.openxmlformats.org/drawingml/2006/main" xmlns:r="http://schemas.openxmlformats.org/officeDocument/2006/relationships" xmlns:p="http://schemas.openxmlformats.org/presentationml/2006/main">
+  <p:cSld>
+    <p:spTree>
+      <p:nvGrpSpPr>
+        <p:cNvPr id="1" name=""/>
+        <p:cNvGrpSpPr/>
+        <p:nvPr/>
+      </p:nvGrpSpPr>
+      <p:grpSpPr>
+        <a:xfrm>
+          <a:off x="0" y="0"/>
+          <a:ext cx="0" cy="0"/>
+          <a:chOff x="0" y="0"/>
+          <a:chExt cx="0" cy="0"/>
+        </a:xfrm>
+      </p:grpSpPr>
+      <p:sp>
+        <p:nvSpPr>
+          <p:cNvPr id="2" name="Title 1"/>
+          <p:cNvSpPr>
+            <a:spLocks noGrp="1"/>
+          </p:cNvSpPr>
+          <p:nvPr>
+            <p:ph type="title"/>
+          </p:nvPr>
+        </p:nvSpPr>
+        <p:spPr/>
+        <p:txBody>
+          <a:bodyPr/>
+          <a:lstStyle/>
+          <a:p>
+            <a:r>
+              <a:rPr lang="en-GB" dirty="0" smtClean="0"/>
+              <a:t>Wireframes</a:t>
+            </a:r>
+            <a:endParaRPr lang="en-GB" dirty="0"/>
+          </a:p>
+        </p:txBody>
+      </p:sp>
+      <p:pic>
+        <p:nvPicPr>
+          <p:cNvPr id="5" name="Picture 4"/>
+          <p:cNvPicPr>
+            <a:picLocks noChangeAspect="1"/>
+          </p:cNvPicPr>
+          <p:nvPr/>
+        </p:nvPicPr>
+        <p:blipFill>
+          <a:blip r:embed="rId2">
+            <a:extLst>
+              <a:ext uri="{28A0092B-C50C-407E-A947-70E740481C1C}">
+                <a14:useLocalDpi xmlns:a14="http://schemas.microsoft.com/office/drawing/2010/main" val="0"/>
+              </a:ext>
+            </a:extLst>
+          </a:blip>
+          <a:stretch>
+            <a:fillRect/>
+          </a:stretch>
+        </p:blipFill>
+        <p:spPr>
+          <a:xfrm>
+            <a:off x="779461" y="1853248"/>
+            <a:ext cx="4725989" cy="3535417"/>
+          </a:xfrm>
+          <a:prstGeom prst="rect">
+            <a:avLst/>
+          </a:prstGeom>
+        </p:spPr>
+      </p:pic>
+      <p:pic>
+        <p:nvPicPr>
+          <p:cNvPr id="6" name="Picture 5"/>
+          <p:cNvPicPr>
+            <a:picLocks noChangeAspect="1"/>
+          </p:cNvPicPr>
+          <p:nvPr/>
+        </p:nvPicPr>
+        <p:blipFill>
+          <a:blip r:embed="rId3">
+            <a:extLst>
+              <a:ext uri="{28A0092B-C50C-407E-A947-70E740481C1C}">
+                <a14:useLocalDpi xmlns:a14="http://schemas.microsoft.com/office/drawing/2010/main" val="0"/>
+              </a:ext>
+            </a:extLst>
+          </a:blip>
+          <a:stretch>
+            <a:fillRect/>
+          </a:stretch>
+        </p:blipFill>
+        <p:spPr>
+          <a:xfrm>
+            <a:off x="6286499" y="1853248"/>
+            <a:ext cx="5008507" cy="3535417"/>
+          </a:xfrm>
+          <a:prstGeom prst="rect">
+            <a:avLst/>
+          </a:prstGeom>
+        </p:spPr>
+      </p:pic>
+      <p:sp>
+        <p:nvSpPr>
+          <p:cNvPr id="7" name="TextBox 6"/>
+          <p:cNvSpPr txBox="1"/>
+          <p:nvPr/>
+        </p:nvSpPr>
+        <p:spPr>
+          <a:xfrm>
+            <a:off x="2455647" y="5388665"/>
+            <a:ext cx="7478928" cy="369332"/>
+          </a:xfrm>
+          <a:prstGeom prst="rect">
+            <a:avLst/>
+          </a:prstGeom>
+          <a:noFill/>
+        </p:spPr>
+        <p:txBody>
+          <a:bodyPr wrap="square" rtlCol="0">
+            <a:spAutoFit/>
+          </a:bodyPr>
+          <a:lstStyle/>
+          <a:p>
+            <a:r>
+              <a:rPr lang="en-GB" dirty="0" smtClean="0"/>
+              <a:t>Example wireframes from the web app and desktop respectively</a:t>
+            </a:r>
+            <a:endParaRPr lang="en-GB" dirty="0"/>
+          </a:p>
+        </p:txBody>
+      </p:sp>
+    </p:spTree>
+    <p:extLst>
+      <p:ext uri="{BB962C8B-B14F-4D97-AF65-F5344CB8AC3E}">
+        <p14:creationId xmlns:p14="http://schemas.microsoft.com/office/powerpoint/2010/main" val="1826836129"/>
+      </p:ext>
+    </p:extLst>
+  </p:cSld>
+  <p:clrMapOvr>
+    <a:masterClrMapping/>
+  </p:clrMapOvr>
+  <p:timing>
+    <p:tnLst>
+      <p:par>
+        <p:cTn id="1" dur="indefinite" restart="never" nodeType="tmRoot"/>
+      </p:par>
+    </p:tnLst>
+  </p:timing>
+</p:sld>
+</file>
+
+<file path=ppt/slides/slide19.xml><?xml version="1.0" encoding="utf-8"?>
+<p:sld xmlns:a="http://schemas.openxmlformats.org/drawingml/2006/main" xmlns:r="http://schemas.openxmlformats.org/officeDocument/2006/relationships" xmlns:p="http://schemas.openxmlformats.org/presentationml/2006/main">
+  <p:cSld>
+    <p:spTree>
+      <p:nvGrpSpPr>
+        <p:cNvPr id="1" name=""/>
+        <p:cNvGrpSpPr/>
+        <p:nvPr/>
+      </p:nvGrpSpPr>
+      <p:grpSpPr>
+        <a:xfrm>
+          <a:off x="0" y="0"/>
+          <a:ext cx="0" cy="0"/>
+          <a:chOff x="0" y="0"/>
+          <a:chExt cx="0" cy="0"/>
+        </a:xfrm>
+      </p:grpSpPr>
+      <p:sp>
+        <p:nvSpPr>
+          <p:cNvPr id="7" name="Title 6"/>
+          <p:cNvSpPr>
+            <a:spLocks noGrp="1"/>
+          </p:cNvSpPr>
+          <p:nvPr>
+            <p:ph type="title"/>
+          </p:nvPr>
+        </p:nvSpPr>
+        <p:spPr/>
+        <p:txBody>
+          <a:bodyPr/>
+          <a:lstStyle/>
+          <a:p>
+            <a:r>
+              <a:rPr lang="en-GB" dirty="0" smtClean="0"/>
+              <a:t>Live Demo</a:t>
+            </a:r>
+            <a:endParaRPr lang="en-GB" dirty="0"/>
+          </a:p>
+        </p:txBody>
+      </p:sp>
+      <p:sp>
+        <p:nvSpPr>
+          <p:cNvPr id="8" name="Text Placeholder 7"/>
+          <p:cNvSpPr>
+            <a:spLocks noGrp="1"/>
+          </p:cNvSpPr>
+          <p:nvPr>
+            <p:ph type="body" idx="1"/>
+          </p:nvPr>
+        </p:nvSpPr>
+        <p:spPr>
+          <a:xfrm>
+            <a:off x="1154955" y="4777380"/>
+            <a:ext cx="8825658" cy="860400"/>
+          </a:xfrm>
+        </p:spPr>
+        <p:txBody>
+          <a:bodyPr/>
+          <a:lstStyle/>
+          <a:p>
+            <a:r>
+              <a:rPr lang="en-GB" dirty="0" smtClean="0"/>
+              <a:t>Java desktop app &amp; HTML web app</a:t>
+            </a:r>
+            <a:endParaRPr lang="en-GB" dirty="0"/>
+          </a:p>
+        </p:txBody>
+      </p:sp>
+    </p:spTree>
+    <p:extLst>
+      <p:ext uri="{BB962C8B-B14F-4D97-AF65-F5344CB8AC3E}">
+        <p14:creationId xmlns:p14="http://schemas.microsoft.com/office/powerpoint/2010/main" val="1015714020"/>
       </p:ext>
     </p:extLst>
   </p:cSld>
@@ -6463,6 +7357,220 @@
           <a:p>
             <a:r>
               <a:rPr lang="en-GB" dirty="0" smtClean="0"/>
+              <a:t>Initial Investigation</a:t>
+            </a:r>
+            <a:endParaRPr lang="en-GB" dirty="0"/>
+          </a:p>
+        </p:txBody>
+      </p:sp>
+      <p:sp>
+        <p:nvSpPr>
+          <p:cNvPr id="7" name="Content Placeholder 6"/>
+          <p:cNvSpPr>
+            <a:spLocks noGrp="1"/>
+          </p:cNvSpPr>
+          <p:nvPr>
+            <p:ph sz="half" idx="1"/>
+          </p:nvPr>
+        </p:nvSpPr>
+        <p:spPr/>
+        <p:txBody>
+          <a:bodyPr anchor="ctr"/>
+          <a:lstStyle/>
+          <a:p>
+            <a:r>
+              <a:rPr lang="en-GB" dirty="0" smtClean="0"/>
+              <a:t>NB Gardens</a:t>
+            </a:r>
+          </a:p>
+          <a:p>
+            <a:pPr lvl="1"/>
+            <a:r>
+              <a:rPr lang="en-GB" dirty="0" smtClean="0"/>
+              <a:t>Traditional Catalogue Company</a:t>
+            </a:r>
+          </a:p>
+          <a:p>
+            <a:r>
+              <a:rPr lang="en-GB" dirty="0" smtClean="0"/>
+              <a:t>Interviews</a:t>
+            </a:r>
+          </a:p>
+          <a:p>
+            <a:pPr lvl="1"/>
+            <a:r>
+              <a:rPr lang="en-GB" dirty="0" smtClean="0"/>
+              <a:t>Senior Management</a:t>
+            </a:r>
+          </a:p>
+          <a:p>
+            <a:pPr lvl="1"/>
+            <a:r>
+              <a:rPr lang="en-GB" dirty="0" smtClean="0"/>
+              <a:t>Lower </a:t>
+            </a:r>
+            <a:r>
+              <a:rPr lang="en-GB" dirty="0"/>
+              <a:t>L</a:t>
+            </a:r>
+            <a:r>
+              <a:rPr lang="en-GB" dirty="0" smtClean="0"/>
+              <a:t>evel Employees</a:t>
+            </a:r>
+          </a:p>
+          <a:p>
+            <a:r>
+              <a:rPr lang="en-GB" dirty="0" smtClean="0"/>
+              <a:t>Architect the Business</a:t>
+            </a:r>
+            <a:endParaRPr lang="en-GB" dirty="0"/>
+          </a:p>
+        </p:txBody>
+      </p:sp>
+      <p:pic>
+        <p:nvPicPr>
+          <p:cNvPr id="2" name="Picture 1"/>
+          <p:cNvPicPr>
+            <a:picLocks noChangeAspect="1"/>
+          </p:cNvPicPr>
+          <p:nvPr/>
+        </p:nvPicPr>
+        <p:blipFill>
+          <a:blip r:embed="rId2">
+            <a:extLst>
+              <a:ext uri="{28A0092B-C50C-407E-A947-70E740481C1C}">
+                <a14:useLocalDpi xmlns:a14="http://schemas.microsoft.com/office/drawing/2010/main" val="0"/>
+              </a:ext>
+            </a:extLst>
+          </a:blip>
+          <a:stretch>
+            <a:fillRect/>
+          </a:stretch>
+        </p:blipFill>
+        <p:spPr>
+          <a:xfrm>
+            <a:off x="7296150" y="2428875"/>
+            <a:ext cx="3219450" cy="3219450"/>
+          </a:xfrm>
+          <a:prstGeom prst="rect">
+            <a:avLst/>
+          </a:prstGeom>
+        </p:spPr>
+      </p:pic>
+    </p:spTree>
+    <p:extLst>
+      <p:ext uri="{BB962C8B-B14F-4D97-AF65-F5344CB8AC3E}">
+        <p14:creationId xmlns:p14="http://schemas.microsoft.com/office/powerpoint/2010/main" val="2884908757"/>
+      </p:ext>
+    </p:extLst>
+  </p:cSld>
+  <p:clrMapOvr>
+    <a:masterClrMapping/>
+  </p:clrMapOvr>
+  <p:timing>
+    <p:tnLst>
+      <p:par>
+        <p:cTn id="1" dur="indefinite" restart="never" nodeType="tmRoot"/>
+      </p:par>
+    </p:tnLst>
+  </p:timing>
+</p:sld>
+</file>
+
+<file path=ppt/slides/slide20.xml><?xml version="1.0" encoding="utf-8"?>
+<p:sld xmlns:a="http://schemas.openxmlformats.org/drawingml/2006/main" xmlns:r="http://schemas.openxmlformats.org/officeDocument/2006/relationships" xmlns:p="http://schemas.openxmlformats.org/presentationml/2006/main">
+  <p:cSld>
+    <p:spTree>
+      <p:nvGrpSpPr>
+        <p:cNvPr id="1" name=""/>
+        <p:cNvGrpSpPr/>
+        <p:nvPr/>
+      </p:nvGrpSpPr>
+      <p:grpSpPr>
+        <a:xfrm>
+          <a:off x="0" y="0"/>
+          <a:ext cx="0" cy="0"/>
+          <a:chOff x="0" y="0"/>
+          <a:chExt cx="0" cy="0"/>
+        </a:xfrm>
+      </p:grpSpPr>
+      <p:sp>
+        <p:nvSpPr>
+          <p:cNvPr id="7" name="Title 6"/>
+          <p:cNvSpPr>
+            <a:spLocks noGrp="1"/>
+          </p:cNvSpPr>
+          <p:nvPr>
+            <p:ph type="title"/>
+          </p:nvPr>
+        </p:nvSpPr>
+        <p:spPr/>
+        <p:txBody>
+          <a:bodyPr/>
+          <a:lstStyle/>
+          <a:p>
+            <a:r>
+              <a:rPr lang="en-GB" dirty="0" smtClean="0"/>
+              <a:t>Questions?</a:t>
+            </a:r>
+            <a:endParaRPr lang="en-GB" dirty="0"/>
+          </a:p>
+        </p:txBody>
+      </p:sp>
+    </p:spTree>
+    <p:extLst>
+      <p:ext uri="{BB962C8B-B14F-4D97-AF65-F5344CB8AC3E}">
+        <p14:creationId xmlns:p14="http://schemas.microsoft.com/office/powerpoint/2010/main" val="1417643140"/>
+      </p:ext>
+    </p:extLst>
+  </p:cSld>
+  <p:clrMapOvr>
+    <a:masterClrMapping/>
+  </p:clrMapOvr>
+  <p:timing>
+    <p:tnLst>
+      <p:par>
+        <p:cTn id="1" dur="indefinite" restart="never" nodeType="tmRoot"/>
+      </p:par>
+    </p:tnLst>
+  </p:timing>
+</p:sld>
+</file>
+
+<file path=ppt/slides/slide3.xml><?xml version="1.0" encoding="utf-8"?>
+<p:sld xmlns:a="http://schemas.openxmlformats.org/drawingml/2006/main" xmlns:r="http://schemas.openxmlformats.org/officeDocument/2006/relationships" xmlns:p="http://schemas.openxmlformats.org/presentationml/2006/main">
+  <p:cSld>
+    <p:spTree>
+      <p:nvGrpSpPr>
+        <p:cNvPr id="1" name=""/>
+        <p:cNvGrpSpPr/>
+        <p:nvPr/>
+      </p:nvGrpSpPr>
+      <p:grpSpPr>
+        <a:xfrm>
+          <a:off x="0" y="0"/>
+          <a:ext cx="0" cy="0"/>
+          <a:chOff x="0" y="0"/>
+          <a:chExt cx="0" cy="0"/>
+        </a:xfrm>
+      </p:grpSpPr>
+      <p:sp>
+        <p:nvSpPr>
+          <p:cNvPr id="4" name="Title 3"/>
+          <p:cNvSpPr>
+            <a:spLocks noGrp="1"/>
+          </p:cNvSpPr>
+          <p:nvPr>
+            <p:ph type="title"/>
+          </p:nvPr>
+        </p:nvSpPr>
+        <p:spPr/>
+        <p:txBody>
+          <a:bodyPr/>
+          <a:lstStyle/>
+          <a:p>
+            <a:r>
+              <a:rPr lang="en-GB" dirty="0" smtClean="0"/>
               <a:t>Why are we here?</a:t>
             </a:r>
             <a:endParaRPr lang="en-GB" dirty="0"/>
@@ -6570,223 +7678,20 @@
     </p:spTree>
     <p:extLst>
       <p:ext uri="{BB962C8B-B14F-4D97-AF65-F5344CB8AC3E}">
-        <p14:creationId xmlns:p14="http://schemas.microsoft.com/office/powerpoint/2010/main" val="2884908757"/>
+        <p14:creationId xmlns:p14="http://schemas.microsoft.com/office/powerpoint/2010/main" val="1787453007"/>
       </p:ext>
     </p:extLst>
   </p:cSld>
   <p:clrMapOvr>
     <a:masterClrMapping/>
   </p:clrMapOvr>
-</p:sld>
-</file>
-
-<file path=ppt/slides/slide3.xml><?xml version="1.0" encoding="utf-8"?>
-<p:sld xmlns:a="http://schemas.openxmlformats.org/drawingml/2006/main" xmlns:r="http://schemas.openxmlformats.org/officeDocument/2006/relationships" xmlns:p="http://schemas.openxmlformats.org/presentationml/2006/main">
-  <p:cSld>
-    <p:spTree>
-      <p:nvGrpSpPr>
-        <p:cNvPr id="1" name=""/>
-        <p:cNvGrpSpPr/>
-        <p:nvPr/>
-      </p:nvGrpSpPr>
-      <p:grpSpPr>
-        <a:xfrm>
-          <a:off x="0" y="0"/>
-          <a:ext cx="0" cy="0"/>
-          <a:chOff x="0" y="0"/>
-          <a:chExt cx="0" cy="0"/>
-        </a:xfrm>
-      </p:grpSpPr>
-      <p:sp>
-        <p:nvSpPr>
-          <p:cNvPr id="5" name="TextBox 4"/>
-          <p:cNvSpPr txBox="1"/>
-          <p:nvPr/>
-        </p:nvSpPr>
-        <p:spPr>
-          <a:xfrm>
-            <a:off x="445895" y="647410"/>
-            <a:ext cx="9620740" cy="400110"/>
-          </a:xfrm>
-          <a:prstGeom prst="rect">
-            <a:avLst/>
-          </a:prstGeom>
-          <a:noFill/>
-        </p:spPr>
-        <p:txBody>
-          <a:bodyPr wrap="square" rtlCol="0">
-            <a:spAutoFit/>
-          </a:bodyPr>
-          <a:lstStyle/>
-          <a:p>
-            <a:r>
-              <a:rPr lang="en-GB" sz="2000" dirty="0" smtClean="0"/>
-              <a:t>As a visitor I want to be able to enter my details so I can become a customer</a:t>
-            </a:r>
-            <a:endParaRPr lang="en-GB" sz="2000" dirty="0"/>
-          </a:p>
-        </p:txBody>
-      </p:sp>
-      <p:sp>
-        <p:nvSpPr>
-          <p:cNvPr id="6" name="TextBox 5"/>
-          <p:cNvSpPr txBox="1"/>
-          <p:nvPr/>
-        </p:nvSpPr>
-        <p:spPr>
-          <a:xfrm>
-            <a:off x="1029729" y="1816558"/>
-            <a:ext cx="12035481" cy="523220"/>
-          </a:xfrm>
-          <a:prstGeom prst="rect">
-            <a:avLst/>
-          </a:prstGeom>
-          <a:noFill/>
-        </p:spPr>
-        <p:txBody>
-          <a:bodyPr wrap="square" rtlCol="0">
-            <a:spAutoFit/>
-          </a:bodyPr>
-          <a:lstStyle/>
-          <a:p>
-            <a:r>
-              <a:rPr lang="en-GB" sz="2800" dirty="0" smtClean="0"/>
-              <a:t>As a visitor I should be able to browse though a list of products</a:t>
-            </a:r>
-            <a:endParaRPr lang="en-GB" sz="2800" dirty="0"/>
-          </a:p>
-        </p:txBody>
-      </p:sp>
-      <p:sp>
-        <p:nvSpPr>
-          <p:cNvPr id="7" name="TextBox 6"/>
-          <p:cNvSpPr txBox="1"/>
-          <p:nvPr/>
-        </p:nvSpPr>
-        <p:spPr>
-          <a:xfrm>
-            <a:off x="741405" y="2709110"/>
-            <a:ext cx="8773297" cy="461665"/>
-          </a:xfrm>
-          <a:prstGeom prst="rect">
-            <a:avLst/>
-          </a:prstGeom>
-          <a:noFill/>
-        </p:spPr>
-        <p:txBody>
-          <a:bodyPr wrap="square" rtlCol="0">
-            <a:spAutoFit/>
-          </a:bodyPr>
-          <a:lstStyle/>
-          <a:p>
-            <a:r>
-              <a:rPr lang="en-GB" sz="2400" dirty="0" smtClean="0"/>
-              <a:t>As a customer I want to be able to check my credit</a:t>
-            </a:r>
-            <a:endParaRPr lang="en-GB" sz="2400" dirty="0"/>
-          </a:p>
-        </p:txBody>
-      </p:sp>
-      <p:sp>
-        <p:nvSpPr>
-          <p:cNvPr id="8" name="TextBox 7"/>
-          <p:cNvSpPr txBox="1"/>
-          <p:nvPr/>
-        </p:nvSpPr>
-        <p:spPr>
-          <a:xfrm>
-            <a:off x="2281807" y="3778083"/>
-            <a:ext cx="9704246" cy="400110"/>
-          </a:xfrm>
-          <a:prstGeom prst="rect">
-            <a:avLst/>
-          </a:prstGeom>
-          <a:noFill/>
-        </p:spPr>
-        <p:txBody>
-          <a:bodyPr wrap="square" rtlCol="0">
-            <a:spAutoFit/>
-          </a:bodyPr>
-          <a:lstStyle/>
-          <a:p>
-            <a:r>
-              <a:rPr lang="en-GB" sz="2000" dirty="0" smtClean="0"/>
-              <a:t>As a customer I want to be able to place an order for the items in my basket</a:t>
-            </a:r>
-            <a:endParaRPr lang="en-GB" sz="2000" dirty="0"/>
-          </a:p>
-        </p:txBody>
-      </p:sp>
-      <p:sp>
-        <p:nvSpPr>
-          <p:cNvPr id="9" name="TextBox 8"/>
-          <p:cNvSpPr txBox="1"/>
-          <p:nvPr/>
-        </p:nvSpPr>
-        <p:spPr>
-          <a:xfrm>
-            <a:off x="1293338" y="4577496"/>
-            <a:ext cx="8773297" cy="369332"/>
-          </a:xfrm>
-          <a:prstGeom prst="rect">
-            <a:avLst/>
-          </a:prstGeom>
-          <a:noFill/>
-        </p:spPr>
-        <p:txBody>
-          <a:bodyPr wrap="square" rtlCol="0">
-            <a:spAutoFit/>
-          </a:bodyPr>
-          <a:lstStyle/>
-          <a:p>
-            <a:r>
-              <a:rPr lang="en-GB" dirty="0" smtClean="0"/>
-              <a:t>As an inventory manager I want to see the daily stock report</a:t>
-            </a:r>
-            <a:endParaRPr lang="en-GB" dirty="0"/>
-          </a:p>
-        </p:txBody>
-      </p:sp>
-      <p:sp>
-        <p:nvSpPr>
-          <p:cNvPr id="10" name="TextBox 9"/>
-          <p:cNvSpPr txBox="1"/>
-          <p:nvPr/>
-        </p:nvSpPr>
-        <p:spPr>
-          <a:xfrm>
-            <a:off x="569467" y="5346131"/>
-            <a:ext cx="11042822" cy="830997"/>
-          </a:xfrm>
-          <a:prstGeom prst="rect">
-            <a:avLst/>
-          </a:prstGeom>
-          <a:noFill/>
-        </p:spPr>
-        <p:txBody>
-          <a:bodyPr wrap="square" rtlCol="0">
-            <a:spAutoFit/>
-          </a:bodyPr>
-          <a:lstStyle/>
-          <a:p>
-            <a:r>
-              <a:rPr lang="en-GB" sz="2400" dirty="0" smtClean="0"/>
-              <a:t>As an inventory manager I want to be able to make purchase orders of low and new stock lines</a:t>
-            </a:r>
-            <a:endParaRPr lang="en-GB" sz="2400" dirty="0"/>
-          </a:p>
-        </p:txBody>
-      </p:sp>
-    </p:spTree>
-    <p:extLst>
-      <p:ext uri="{BB962C8B-B14F-4D97-AF65-F5344CB8AC3E}">
-        <p14:creationId xmlns:p14="http://schemas.microsoft.com/office/powerpoint/2010/main" val="2721030315"/>
-      </p:ext>
-    </p:extLst>
-  </p:cSld>
-  <p:clrMapOvr>
-    <a:masterClrMapping/>
-  </p:clrMapOvr>
+  <p:timing>
+    <p:tnLst>
+      <p:par>
+        <p:cTn id="1" dur="indefinite" restart="never" nodeType="tmRoot"/>
+      </p:par>
+    </p:tnLst>
+  </p:timing>
 </p:sld>
 </file>
 
@@ -6809,6 +7714,223 @@
       </p:grpSpPr>
       <p:sp>
         <p:nvSpPr>
+          <p:cNvPr id="5" name="TextBox 4"/>
+          <p:cNvSpPr txBox="1"/>
+          <p:nvPr/>
+        </p:nvSpPr>
+        <p:spPr>
+          <a:xfrm>
+            <a:off x="445895" y="647410"/>
+            <a:ext cx="9620740" cy="400110"/>
+          </a:xfrm>
+          <a:prstGeom prst="rect">
+            <a:avLst/>
+          </a:prstGeom>
+          <a:noFill/>
+        </p:spPr>
+        <p:txBody>
+          <a:bodyPr wrap="square" rtlCol="0">
+            <a:spAutoFit/>
+          </a:bodyPr>
+          <a:lstStyle/>
+          <a:p>
+            <a:r>
+              <a:rPr lang="en-GB" sz="2000" dirty="0" smtClean="0"/>
+              <a:t>As a visitor I want to be able to enter my details so I can become a customer</a:t>
+            </a:r>
+            <a:endParaRPr lang="en-GB" sz="2000" dirty="0"/>
+          </a:p>
+        </p:txBody>
+      </p:sp>
+      <p:sp>
+        <p:nvSpPr>
+          <p:cNvPr id="6" name="TextBox 5"/>
+          <p:cNvSpPr txBox="1"/>
+          <p:nvPr/>
+        </p:nvSpPr>
+        <p:spPr>
+          <a:xfrm>
+            <a:off x="1029729" y="1816558"/>
+            <a:ext cx="12035481" cy="523220"/>
+          </a:xfrm>
+          <a:prstGeom prst="rect">
+            <a:avLst/>
+          </a:prstGeom>
+          <a:noFill/>
+        </p:spPr>
+        <p:txBody>
+          <a:bodyPr wrap="square" rtlCol="0">
+            <a:spAutoFit/>
+          </a:bodyPr>
+          <a:lstStyle/>
+          <a:p>
+            <a:r>
+              <a:rPr lang="en-GB" sz="2800" dirty="0" smtClean="0"/>
+              <a:t>As a visitor I should be able to browse though a list of products</a:t>
+            </a:r>
+            <a:endParaRPr lang="en-GB" sz="2800" dirty="0"/>
+          </a:p>
+        </p:txBody>
+      </p:sp>
+      <p:sp>
+        <p:nvSpPr>
+          <p:cNvPr id="7" name="TextBox 6"/>
+          <p:cNvSpPr txBox="1"/>
+          <p:nvPr/>
+        </p:nvSpPr>
+        <p:spPr>
+          <a:xfrm>
+            <a:off x="741405" y="2709110"/>
+            <a:ext cx="8773297" cy="461665"/>
+          </a:xfrm>
+          <a:prstGeom prst="rect">
+            <a:avLst/>
+          </a:prstGeom>
+          <a:noFill/>
+        </p:spPr>
+        <p:txBody>
+          <a:bodyPr wrap="square" rtlCol="0">
+            <a:spAutoFit/>
+          </a:bodyPr>
+          <a:lstStyle/>
+          <a:p>
+            <a:r>
+              <a:rPr lang="en-GB" sz="2400" dirty="0" smtClean="0"/>
+              <a:t>As a customer I want to be able to check my credit</a:t>
+            </a:r>
+            <a:endParaRPr lang="en-GB" sz="2400" dirty="0"/>
+          </a:p>
+        </p:txBody>
+      </p:sp>
+      <p:sp>
+        <p:nvSpPr>
+          <p:cNvPr id="8" name="TextBox 7"/>
+          <p:cNvSpPr txBox="1"/>
+          <p:nvPr/>
+        </p:nvSpPr>
+        <p:spPr>
+          <a:xfrm>
+            <a:off x="2281807" y="3778083"/>
+            <a:ext cx="9704246" cy="400110"/>
+          </a:xfrm>
+          <a:prstGeom prst="rect">
+            <a:avLst/>
+          </a:prstGeom>
+          <a:noFill/>
+        </p:spPr>
+        <p:txBody>
+          <a:bodyPr wrap="square" rtlCol="0">
+            <a:spAutoFit/>
+          </a:bodyPr>
+          <a:lstStyle/>
+          <a:p>
+            <a:r>
+              <a:rPr lang="en-GB" sz="2000" dirty="0" smtClean="0"/>
+              <a:t>As a customer I want to be able to place an order for the items in my basket</a:t>
+            </a:r>
+            <a:endParaRPr lang="en-GB" sz="2000" dirty="0"/>
+          </a:p>
+        </p:txBody>
+      </p:sp>
+      <p:sp>
+        <p:nvSpPr>
+          <p:cNvPr id="9" name="TextBox 8"/>
+          <p:cNvSpPr txBox="1"/>
+          <p:nvPr/>
+        </p:nvSpPr>
+        <p:spPr>
+          <a:xfrm>
+            <a:off x="1293338" y="4577496"/>
+            <a:ext cx="8773297" cy="369332"/>
+          </a:xfrm>
+          <a:prstGeom prst="rect">
+            <a:avLst/>
+          </a:prstGeom>
+          <a:noFill/>
+        </p:spPr>
+        <p:txBody>
+          <a:bodyPr wrap="square" rtlCol="0">
+            <a:spAutoFit/>
+          </a:bodyPr>
+          <a:lstStyle/>
+          <a:p>
+            <a:r>
+              <a:rPr lang="en-GB" dirty="0" smtClean="0"/>
+              <a:t>As an inventory manager I want to see the daily stock report</a:t>
+            </a:r>
+            <a:endParaRPr lang="en-GB" dirty="0"/>
+          </a:p>
+        </p:txBody>
+      </p:sp>
+      <p:sp>
+        <p:nvSpPr>
+          <p:cNvPr id="10" name="TextBox 9"/>
+          <p:cNvSpPr txBox="1"/>
+          <p:nvPr/>
+        </p:nvSpPr>
+        <p:spPr>
+          <a:xfrm>
+            <a:off x="569467" y="5346131"/>
+            <a:ext cx="11042822" cy="830997"/>
+          </a:xfrm>
+          <a:prstGeom prst="rect">
+            <a:avLst/>
+          </a:prstGeom>
+          <a:noFill/>
+        </p:spPr>
+        <p:txBody>
+          <a:bodyPr wrap="square" rtlCol="0">
+            <a:spAutoFit/>
+          </a:bodyPr>
+          <a:lstStyle/>
+          <a:p>
+            <a:r>
+              <a:rPr lang="en-GB" sz="2400" dirty="0" smtClean="0"/>
+              <a:t>As an inventory manager I want to be able to make purchase orders of low and new stock lines</a:t>
+            </a:r>
+            <a:endParaRPr lang="en-GB" sz="2400" dirty="0"/>
+          </a:p>
+        </p:txBody>
+      </p:sp>
+    </p:spTree>
+    <p:extLst>
+      <p:ext uri="{BB962C8B-B14F-4D97-AF65-F5344CB8AC3E}">
+        <p14:creationId xmlns:p14="http://schemas.microsoft.com/office/powerpoint/2010/main" val="2721030315"/>
+      </p:ext>
+    </p:extLst>
+  </p:cSld>
+  <p:clrMapOvr>
+    <a:masterClrMapping/>
+  </p:clrMapOvr>
+  <p:timing>
+    <p:tnLst>
+      <p:par>
+        <p:cTn id="1" dur="indefinite" restart="never" nodeType="tmRoot"/>
+      </p:par>
+    </p:tnLst>
+  </p:timing>
+</p:sld>
+</file>
+
+<file path=ppt/slides/slide5.xml><?xml version="1.0" encoding="utf-8"?>
+<p:sld xmlns:a="http://schemas.openxmlformats.org/drawingml/2006/main" xmlns:r="http://schemas.openxmlformats.org/officeDocument/2006/relationships" xmlns:p="http://schemas.openxmlformats.org/presentationml/2006/main">
+  <p:cSld>
+    <p:spTree>
+      <p:nvGrpSpPr>
+        <p:cNvPr id="1" name=""/>
+        <p:cNvGrpSpPr/>
+        <p:nvPr/>
+      </p:nvGrpSpPr>
+      <p:grpSpPr>
+        <a:xfrm>
+          <a:off x="0" y="0"/>
+          <a:ext cx="0" cy="0"/>
+          <a:chOff x="0" y="0"/>
+          <a:chExt cx="0" cy="0"/>
+        </a:xfrm>
+      </p:grpSpPr>
+      <p:sp>
+        <p:nvSpPr>
           <p:cNvPr id="2" name="Title 1"/>
           <p:cNvSpPr>
             <a:spLocks noGrp="1"/>
@@ -6840,10 +7962,17 @@
   <p:clrMapOvr>
     <a:masterClrMapping/>
   </p:clrMapOvr>
+  <p:timing>
+    <p:tnLst>
+      <p:par>
+        <p:cTn id="1" dur="indefinite" restart="never" nodeType="tmRoot"/>
+      </p:par>
+    </p:tnLst>
+  </p:timing>
 </p:sld>
 </file>
 
-<file path=ppt/slides/slide5.xml><?xml version="1.0" encoding="utf-8"?>
+<file path=ppt/slides/slide6.xml><?xml version="1.0" encoding="utf-8"?>
 <p:sld xmlns:a="http://schemas.openxmlformats.org/drawingml/2006/main" xmlns:r="http://schemas.openxmlformats.org/officeDocument/2006/relationships" xmlns:p="http://schemas.openxmlformats.org/presentationml/2006/main">
   <p:cSld>
     <p:spTree>
@@ -7266,7 +8395,7 @@
 </p:sld>
 </file>
 
-<file path=ppt/slides/slide6.xml><?xml version="1.0" encoding="utf-8"?>
+<file path=ppt/slides/slide7.xml><?xml version="1.0" encoding="utf-8"?>
 <p:sld xmlns:a="http://schemas.openxmlformats.org/drawingml/2006/main" xmlns:r="http://schemas.openxmlformats.org/officeDocument/2006/relationships" xmlns:p="http://schemas.openxmlformats.org/presentationml/2006/main">
   <p:cSld>
     <p:spTree>
@@ -7303,6 +8432,129 @@
               <a:t>MySQL + Mongo DB</a:t>
             </a:r>
             <a:endParaRPr lang="en-GB" dirty="0"/>
+          </a:p>
+        </p:txBody>
+      </p:sp>
+      <p:sp>
+        <p:nvSpPr>
+          <p:cNvPr id="3" name="Content Placeholder 2"/>
+          <p:cNvSpPr>
+            <a:spLocks noGrp="1"/>
+          </p:cNvSpPr>
+          <p:nvPr>
+            <p:ph sz="half" idx="1"/>
+          </p:nvPr>
+        </p:nvSpPr>
+        <p:spPr/>
+        <p:txBody>
+          <a:bodyPr/>
+          <a:lstStyle/>
+          <a:p>
+            <a:r>
+              <a:rPr lang="en-GB" dirty="0" smtClean="0"/>
+              <a:t>Mongo DB</a:t>
+            </a:r>
+          </a:p>
+          <a:p>
+            <a:pPr lvl="1"/>
+            <a:r>
+              <a:rPr lang="en-GB" dirty="0" smtClean="0"/>
+              <a:t>Pros</a:t>
+            </a:r>
+          </a:p>
+          <a:p>
+            <a:pPr lvl="2"/>
+            <a:r>
+              <a:rPr lang="en-GB" dirty="0" smtClean="0"/>
+              <a:t>JSON Based</a:t>
+            </a:r>
+          </a:p>
+          <a:p>
+            <a:pPr lvl="2"/>
+            <a:r>
+              <a:rPr lang="en-GB" dirty="0" smtClean="0"/>
+              <a:t>Flexible</a:t>
+            </a:r>
+          </a:p>
+          <a:p>
+            <a:pPr lvl="2"/>
+            <a:endParaRPr lang="en-GB" dirty="0"/>
+          </a:p>
+          <a:p>
+            <a:pPr lvl="1"/>
+            <a:r>
+              <a:rPr lang="en-GB" dirty="0" smtClean="0"/>
+              <a:t>Examples</a:t>
+            </a:r>
+          </a:p>
+          <a:p>
+            <a:pPr lvl="2"/>
+            <a:r>
+              <a:rPr lang="en-GB" dirty="0" smtClean="0"/>
+              <a:t>Item Store</a:t>
+            </a:r>
+          </a:p>
+        </p:txBody>
+      </p:sp>
+      <p:sp>
+        <p:nvSpPr>
+          <p:cNvPr id="4" name="Content Placeholder 3"/>
+          <p:cNvSpPr>
+            <a:spLocks noGrp="1"/>
+          </p:cNvSpPr>
+          <p:nvPr>
+            <p:ph sz="half" idx="2"/>
+          </p:nvPr>
+        </p:nvSpPr>
+        <p:spPr/>
+        <p:txBody>
+          <a:bodyPr/>
+          <a:lstStyle/>
+          <a:p>
+            <a:r>
+              <a:rPr lang="en-GB" dirty="0" smtClean="0"/>
+              <a:t>MySQL</a:t>
+            </a:r>
+          </a:p>
+          <a:p>
+            <a:pPr lvl="1"/>
+            <a:r>
+              <a:rPr lang="en-GB" dirty="0" smtClean="0"/>
+              <a:t>Pros</a:t>
+            </a:r>
+          </a:p>
+          <a:p>
+            <a:pPr lvl="2"/>
+            <a:r>
+              <a:rPr lang="en-GB" dirty="0" smtClean="0"/>
+              <a:t>Rigid Data Structure</a:t>
+            </a:r>
+          </a:p>
+          <a:p>
+            <a:pPr lvl="2"/>
+            <a:r>
+              <a:rPr lang="en-GB" dirty="0" smtClean="0"/>
+              <a:t>Relational</a:t>
+            </a:r>
+            <a:endParaRPr lang="en-GB" dirty="0"/>
+          </a:p>
+          <a:p>
+            <a:pPr lvl="2"/>
+            <a:endParaRPr lang="en-GB" dirty="0" smtClean="0"/>
+          </a:p>
+          <a:p>
+            <a:pPr lvl="1"/>
+            <a:r>
+              <a:rPr lang="en-GB" dirty="0" smtClean="0"/>
+              <a:t>Examples</a:t>
+            </a:r>
+          </a:p>
+          <a:p>
+            <a:pPr lvl="2"/>
+            <a:r>
+              <a:rPr lang="en-GB" dirty="0" smtClean="0"/>
+              <a:t>Customer Orders</a:t>
+            </a:r>
           </a:p>
         </p:txBody>
       </p:sp>
@@ -7326,59 +8578,6 @@
 </p:sld>
 </file>
 
-<file path=ppt/slides/slide7.xml><?xml version="1.0" encoding="utf-8"?>
-<p:sld xmlns:a="http://schemas.openxmlformats.org/drawingml/2006/main" xmlns:r="http://schemas.openxmlformats.org/officeDocument/2006/relationships" xmlns:p="http://schemas.openxmlformats.org/presentationml/2006/main">
-  <p:cSld>
-    <p:spTree>
-      <p:nvGrpSpPr>
-        <p:cNvPr id="1" name=""/>
-        <p:cNvGrpSpPr/>
-        <p:nvPr/>
-      </p:nvGrpSpPr>
-      <p:grpSpPr>
-        <a:xfrm>
-          <a:off x="0" y="0"/>
-          <a:ext cx="0" cy="0"/>
-          <a:chOff x="0" y="0"/>
-          <a:chExt cx="0" cy="0"/>
-        </a:xfrm>
-      </p:grpSpPr>
-      <p:sp>
-        <p:nvSpPr>
-          <p:cNvPr id="3" name="Title 2"/>
-          <p:cNvSpPr>
-            <a:spLocks noGrp="1"/>
-          </p:cNvSpPr>
-          <p:nvPr>
-            <p:ph type="title"/>
-          </p:nvPr>
-        </p:nvSpPr>
-        <p:spPr/>
-        <p:txBody>
-          <a:bodyPr/>
-          <a:lstStyle/>
-          <a:p>
-            <a:r>
-              <a:rPr lang="en-GB" dirty="0" smtClean="0"/>
-              <a:t>System Design</a:t>
-            </a:r>
-            <a:endParaRPr lang="en-GB" dirty="0"/>
-          </a:p>
-        </p:txBody>
-      </p:sp>
-    </p:spTree>
-    <p:extLst>
-      <p:ext uri="{BB962C8B-B14F-4D97-AF65-F5344CB8AC3E}">
-        <p14:creationId xmlns:p14="http://schemas.microsoft.com/office/powerpoint/2010/main" val="4057533121"/>
-      </p:ext>
-    </p:extLst>
-  </p:cSld>
-  <p:clrMapOvr>
-    <a:masterClrMapping/>
-  </p:clrMapOvr>
-</p:sld>
-</file>
-
 <file path=ppt/slides/slide8.xml><?xml version="1.0" encoding="utf-8"?>
 <p:sld xmlns:a="http://schemas.openxmlformats.org/drawingml/2006/main" xmlns:r="http://schemas.openxmlformats.org/officeDocument/2006/relationships" xmlns:p="http://schemas.openxmlformats.org/presentationml/2006/main">
   <p:cSld>
@@ -7398,7 +8597,7 @@
       </p:grpSpPr>
       <p:sp>
         <p:nvSpPr>
-          <p:cNvPr id="4" name="Title 3"/>
+          <p:cNvPr id="2" name="Title 1"/>
           <p:cNvSpPr>
             <a:spLocks noGrp="1"/>
           </p:cNvSpPr>
@@ -7413,61 +8612,7 @@
           <a:p>
             <a:r>
               <a:rPr lang="en-GB" dirty="0" smtClean="0"/>
-              <a:t>Design Patterns</a:t>
-            </a:r>
-            <a:endParaRPr lang="en-GB" dirty="0"/>
-          </a:p>
-        </p:txBody>
-      </p:sp>
-      <p:sp>
-        <p:nvSpPr>
-          <p:cNvPr id="7" name="Content Placeholder 6"/>
-          <p:cNvSpPr>
-            <a:spLocks noGrp="1"/>
-          </p:cNvSpPr>
-          <p:nvPr>
-            <p:ph sz="half" idx="1"/>
-          </p:nvPr>
-        </p:nvSpPr>
-        <p:spPr/>
-        <p:txBody>
-          <a:bodyPr/>
-          <a:lstStyle/>
-          <a:p>
-            <a:r>
-              <a:rPr lang="en-GB" dirty="0" smtClean="0"/>
-              <a:t>MVC</a:t>
-            </a:r>
-          </a:p>
-          <a:p>
-            <a:pPr lvl="1"/>
-            <a:r>
-              <a:rPr lang="en-GB" dirty="0" smtClean="0"/>
-              <a:t>Model</a:t>
-            </a:r>
-          </a:p>
-          <a:p>
-            <a:pPr lvl="1"/>
-            <a:r>
-              <a:rPr lang="en-GB" dirty="0" smtClean="0"/>
-              <a:t>View</a:t>
-            </a:r>
-          </a:p>
-          <a:p>
-            <a:pPr lvl="1"/>
-            <a:r>
-              <a:rPr lang="en-GB" dirty="0" smtClean="0"/>
-              <a:t>Controller</a:t>
-            </a:r>
-          </a:p>
-          <a:p>
-            <a:pPr lvl="1"/>
-            <a:endParaRPr lang="en-GB" dirty="0"/>
-          </a:p>
-          <a:p>
-            <a:r>
-              <a:rPr lang="en-GB" dirty="0" smtClean="0"/>
-              <a:t>Objects First</a:t>
+              <a:t>ERD: Entity Relationship Diagrams</a:t>
             </a:r>
             <a:endParaRPr lang="en-GB" dirty="0"/>
           </a:p>
@@ -7475,13 +8620,13 @@
       </p:sp>
       <p:pic>
         <p:nvPicPr>
-          <p:cNvPr id="1026" name="Picture 2" descr="http://www.doolwind.com/images/blog/MVC.png"/>
+          <p:cNvPr id="8" name="Picture 7"/>
           <p:cNvPicPr>
-            <a:picLocks noChangeAspect="1" noChangeArrowheads="1"/>
+            <a:picLocks noChangeAspect="1"/>
           </p:cNvPicPr>
           <p:nvPr/>
         </p:nvPicPr>
-        <p:blipFill>
+        <p:blipFill rotWithShape="1">
           <a:blip r:embed="rId2">
             <a:extLst>
               <a:ext uri="{28A0092B-C50C-407E-A947-70E740481C1C}">
@@ -7489,41 +8634,95 @@
               </a:ext>
             </a:extLst>
           </a:blip>
-          <a:srcRect/>
-          <a:stretch>
-            <a:fillRect/>
-          </a:stretch>
+          <a:srcRect t="29414" b="697"/>
+          <a:stretch/>
         </p:blipFill>
-        <p:spPr bwMode="auto">
+        <p:spPr>
           <a:xfrm>
-            <a:off x="6277096" y="1390478"/>
-            <a:ext cx="4357953" cy="4499183"/>
+            <a:off x="5799135" y="1257300"/>
+            <a:ext cx="5830889" cy="5373081"/>
+          </a:xfrm>
+          <a:prstGeom prst="rect">
+            <a:avLst/>
+          </a:prstGeom>
+        </p:spPr>
+      </p:pic>
+      <p:pic>
+        <p:nvPicPr>
+          <p:cNvPr id="7" name="Picture 6"/>
+          <p:cNvPicPr>
+            <a:picLocks noChangeAspect="1"/>
+          </p:cNvPicPr>
+          <p:nvPr/>
+        </p:nvPicPr>
+        <p:blipFill rotWithShape="1">
+          <a:blip r:embed="rId2">
+            <a:extLst>
+              <a:ext uri="{28A0092B-C50C-407E-A947-70E740481C1C}">
+                <a14:useLocalDpi xmlns:a14="http://schemas.microsoft.com/office/drawing/2010/main" val="0"/>
+              </a:ext>
+            </a:extLst>
+          </a:blip>
+          <a:srcRect b="70546"/>
+          <a:stretch/>
+        </p:blipFill>
+        <p:spPr>
+          <a:xfrm>
+            <a:off x="646111" y="4096731"/>
+            <a:ext cx="6524027" cy="2533650"/>
+          </a:xfrm>
+          <a:prstGeom prst="rect">
+            <a:avLst/>
+          </a:prstGeom>
+        </p:spPr>
+      </p:pic>
+      <p:sp>
+        <p:nvSpPr>
+          <p:cNvPr id="9" name="TextBox 8"/>
+          <p:cNvSpPr txBox="1"/>
+          <p:nvPr/>
+        </p:nvSpPr>
+        <p:spPr>
+          <a:xfrm>
+            <a:off x="2108198" y="2282492"/>
+            <a:ext cx="2228850" cy="461665"/>
           </a:xfrm>
           <a:prstGeom prst="rect">
             <a:avLst/>
           </a:prstGeom>
           <a:noFill/>
-          <a:extLst>
-            <a:ext uri="{909E8E84-426E-40DD-AFC4-6F175D3DCCD1}">
-              <a14:hiddenFill xmlns:a14="http://schemas.microsoft.com/office/drawing/2010/main">
-                <a:solidFill>
-                  <a:srgbClr val="FFFFFF"/>
-                </a:solidFill>
-              </a14:hiddenFill>
-            </a:ext>
-          </a:extLst>
-        </p:spPr>
-      </p:pic>
+        </p:spPr>
+        <p:txBody>
+          <a:bodyPr wrap="square" rtlCol="0">
+            <a:spAutoFit/>
+          </a:bodyPr>
+          <a:lstStyle/>
+          <a:p>
+            <a:r>
+              <a:rPr lang="en-GB" sz="2400" dirty="0" smtClean="0"/>
+              <a:t>MySQL ERD</a:t>
+            </a:r>
+            <a:endParaRPr lang="en-GB" sz="2400" dirty="0"/>
+          </a:p>
+        </p:txBody>
+      </p:sp>
     </p:spTree>
     <p:extLst>
       <p:ext uri="{BB962C8B-B14F-4D97-AF65-F5344CB8AC3E}">
-        <p14:creationId xmlns:p14="http://schemas.microsoft.com/office/powerpoint/2010/main" val="1493559869"/>
+        <p14:creationId xmlns:p14="http://schemas.microsoft.com/office/powerpoint/2010/main" val="761977960"/>
       </p:ext>
     </p:extLst>
   </p:cSld>
   <p:clrMapOvr>
     <a:masterClrMapping/>
   </p:clrMapOvr>
+  <p:timing>
+    <p:tnLst>
+      <p:par>
+        <p:cTn id="1" dur="indefinite" restart="never" nodeType="tmRoot"/>
+      </p:par>
+    </p:tnLst>
+  </p:timing>
 </p:sld>
 </file>
 
@@ -7561,77 +8760,17 @@
           <a:p>
             <a:r>
               <a:rPr lang="en-GB" dirty="0" smtClean="0"/>
-              <a:t>Utilised Tools</a:t>
+              <a:t>ERD: Entity Relationship Diagrams</a:t>
             </a:r>
             <a:endParaRPr lang="en-GB" dirty="0"/>
-          </a:p>
-        </p:txBody>
-      </p:sp>
-      <p:sp>
-        <p:nvSpPr>
-          <p:cNvPr id="3" name="Content Placeholder 2"/>
-          <p:cNvSpPr>
-            <a:spLocks noGrp="1"/>
-          </p:cNvSpPr>
-          <p:nvPr>
-            <p:ph sz="half" idx="1"/>
-          </p:nvPr>
-        </p:nvSpPr>
-        <p:spPr/>
-        <p:txBody>
-          <a:bodyPr anchor="ctr"/>
-          <a:lstStyle/>
-          <a:p>
-            <a:r>
-              <a:rPr lang="en-GB" dirty="0" smtClean="0"/>
-              <a:t>Maven</a:t>
-            </a:r>
-          </a:p>
-          <a:p>
-            <a:r>
-              <a:rPr lang="en-GB" dirty="0" smtClean="0"/>
-              <a:t>Git</a:t>
-            </a:r>
-          </a:p>
-          <a:p>
-            <a:r>
-              <a:rPr lang="en-GB" dirty="0" err="1" smtClean="0"/>
-              <a:t>Jira</a:t>
-            </a:r>
-            <a:endParaRPr lang="en-GB" dirty="0" smtClean="0"/>
-          </a:p>
-          <a:p>
-            <a:r>
-              <a:rPr lang="en-GB" dirty="0" smtClean="0"/>
-              <a:t>Spring</a:t>
-            </a:r>
-          </a:p>
-          <a:p>
-            <a:r>
-              <a:rPr lang="en-GB" dirty="0" smtClean="0"/>
-              <a:t>Bootstrap</a:t>
-            </a:r>
-          </a:p>
-          <a:p>
-            <a:r>
-              <a:rPr lang="en-GB" dirty="0" smtClean="0"/>
-              <a:t>Swing</a:t>
-            </a:r>
-          </a:p>
-          <a:p>
-            <a:r>
-              <a:rPr lang="en-GB" dirty="0" err="1" smtClean="0"/>
-              <a:t>Docker</a:t>
-            </a:r>
-            <a:endParaRPr lang="en-GB" dirty="0" smtClean="0"/>
           </a:p>
         </p:txBody>
       </p:sp>
       <p:pic>
         <p:nvPicPr>
-          <p:cNvPr id="1026" name="Picture 2" descr="http://pngimg.com/upload/wrench_PNG1116.png"/>
+          <p:cNvPr id="3" name="Picture 2"/>
           <p:cNvPicPr>
-            <a:picLocks noChangeAspect="1" noChangeArrowheads="1"/>
+            <a:picLocks noChangeAspect="1"/>
           </p:cNvPicPr>
           <p:nvPr/>
         </p:nvPicPr>
@@ -7643,41 +8782,37 @@
               </a:ext>
             </a:extLst>
           </a:blip>
-          <a:srcRect/>
           <a:stretch>
             <a:fillRect/>
           </a:stretch>
         </p:blipFill>
-        <p:spPr bwMode="auto">
+        <p:spPr>
           <a:xfrm>
-            <a:off x="5569450" y="2060575"/>
-            <a:ext cx="4481384" cy="3361038"/>
+            <a:off x="1066800" y="1299261"/>
+            <a:ext cx="10058400" cy="5239955"/>
           </a:xfrm>
           <a:prstGeom prst="rect">
             <a:avLst/>
           </a:prstGeom>
-          <a:noFill/>
-          <a:extLst>
-            <a:ext uri="{909E8E84-426E-40DD-AFC4-6F175D3DCCD1}">
-              <a14:hiddenFill xmlns:a14="http://schemas.microsoft.com/office/drawing/2010/main">
-                <a:solidFill>
-                  <a:srgbClr val="FFFFFF"/>
-                </a:solidFill>
-              </a14:hiddenFill>
-            </a:ext>
-          </a:extLst>
         </p:spPr>
       </p:pic>
     </p:spTree>
     <p:extLst>
       <p:ext uri="{BB962C8B-B14F-4D97-AF65-F5344CB8AC3E}">
-        <p14:creationId xmlns:p14="http://schemas.microsoft.com/office/powerpoint/2010/main" val="2164039892"/>
+        <p14:creationId xmlns:p14="http://schemas.microsoft.com/office/powerpoint/2010/main" val="3091425743"/>
       </p:ext>
     </p:extLst>
   </p:cSld>
   <p:clrMapOvr>
     <a:masterClrMapping/>
   </p:clrMapOvr>
+  <p:timing>
+    <p:tnLst>
+      <p:par>
+        <p:cTn id="1" dur="indefinite" restart="never" nodeType="tmRoot"/>
+      </p:par>
+    </p:tnLst>
+  </p:timing>
 </p:sld>
 </file>
 

</xml_diff>